<commit_message>
Fix Typo in week 6/7 PPT
</commit_message>
<xml_diff>
--- a/6. 유니티의 UI.pptx
+++ b/6. 유니티의 UI.pptx
@@ -10600,7 +10600,7 @@
             </a:r>
             <a:r>
               <a:rPr lang="ko-KR" altLang="en-US" dirty="0" err="1"/>
-              <a:t>게임오브젝의</a:t>
+              <a:t>게임오브젝트의</a:t>
             </a:r>
             <a:r>
               <a:rPr lang="ko-KR" altLang="en-US" dirty="0"/>
@@ -10632,12 +10632,8 @@
               <a:t>. </a:t>
             </a:r>
             <a:r>
-              <a:rPr lang="ko-KR" altLang="en-US" dirty="0" err="1"/>
-              <a:t>점수창</a:t>
-            </a:r>
-            <a:r>
-              <a:rPr lang="ko-KR" altLang="en-US" dirty="0"/>
-              <a:t> 만들기</a:t>
+              <a:rPr lang="ko-KR" altLang="en-US" dirty="0"/>
+              <a:t>점수 창 만들기</a:t>
             </a:r>
             <a:endParaRPr lang="en-US" altLang="ko-KR" dirty="0"/>
           </a:p>
@@ -13010,7 +13006,7 @@
             </a:r>
             <a:r>
               <a:rPr lang="ko-KR" altLang="en-US" dirty="0"/>
-              <a:t> 알려준다</a:t>
+              <a:t> 설정하는 것</a:t>
             </a:r>
             <a:endParaRPr lang="en-US" altLang="ko-KR" dirty="0"/>
           </a:p>
@@ -13034,7 +13030,7 @@
             </a:r>
             <a:r>
               <a:rPr lang="ko-KR" altLang="en-US" dirty="0"/>
-              <a:t>게임을 시작했을 때 나타나는 </a:t>
+              <a:t>게임을 시작했을 때 불러오는 </a:t>
             </a:r>
             <a:r>
               <a:rPr lang="en-US" altLang="ko-KR" dirty="0"/>
@@ -14518,12 +14514,8 @@
           <a:p>
             <a:pPr lvl="1"/>
             <a:r>
-              <a:rPr lang="ko-KR" altLang="en-US" dirty="0" err="1"/>
-              <a:t>하얀선</a:t>
-            </a:r>
-            <a:r>
-              <a:rPr lang="ko-KR" altLang="en-US" dirty="0"/>
-              <a:t> </a:t>
+              <a:rPr lang="ko-KR" altLang="en-US" dirty="0"/>
+              <a:t>하얀 테두리 </a:t>
             </a:r>
             <a:r>
               <a:rPr lang="en-US" altLang="ko-KR" dirty="0"/>

</xml_diff>